<commit_message>
Project task 3 uploaded
</commit_message>
<xml_diff>
--- a/pj-task 2/Presentation.pptx
+++ b/pj-task 2/Presentation.pptx
@@ -222,7 +222,7 @@
           <a:p>
             <a:fld id="{162D471D-CAB0-42FC-8983-F8D78CEB512E}" type="datetimeFigureOut">
               <a:rPr lang="en-US" smtClean="0"/>
-              <a:t>4/5/2017</a:t>
+              <a:t>4/10/2017</a:t>
             </a:fld>
             <a:endParaRPr lang="en-US"/>
           </a:p>
@@ -762,7 +762,7 @@
           <a:p>
             <a:fld id="{47A08BB3-D61A-425D-94C0-51D2E3EE8512}" type="datetimeFigureOut">
               <a:rPr lang="en-US" smtClean="0"/>
-              <a:t>4/5/2017</a:t>
+              <a:t>4/10/2017</a:t>
             </a:fld>
             <a:endParaRPr lang="en-US"/>
           </a:p>
@@ -1100,7 +1100,7 @@
           <a:p>
             <a:fld id="{47A08BB3-D61A-425D-94C0-51D2E3EE8512}" type="datetimeFigureOut">
               <a:rPr lang="en-US" smtClean="0"/>
-              <a:t>4/5/2017</a:t>
+              <a:t>4/10/2017</a:t>
             </a:fld>
             <a:endParaRPr lang="en-US"/>
           </a:p>
@@ -1501,7 +1501,7 @@
           <a:p>
             <a:fld id="{47A08BB3-D61A-425D-94C0-51D2E3EE8512}" type="datetimeFigureOut">
               <a:rPr lang="en-US" smtClean="0"/>
-              <a:t>4/5/2017</a:t>
+              <a:t>4/10/2017</a:t>
             </a:fld>
             <a:endParaRPr lang="en-US"/>
           </a:p>
@@ -1837,7 +1837,7 @@
           <a:p>
             <a:fld id="{47A08BB3-D61A-425D-94C0-51D2E3EE8512}" type="datetimeFigureOut">
               <a:rPr lang="en-US" smtClean="0"/>
-              <a:t>4/5/2017</a:t>
+              <a:t>4/10/2017</a:t>
             </a:fld>
             <a:endParaRPr lang="en-US"/>
           </a:p>
@@ -2157,7 +2157,7 @@
           <a:p>
             <a:fld id="{47A08BB3-D61A-425D-94C0-51D2E3EE8512}" type="datetimeFigureOut">
               <a:rPr lang="en-US" smtClean="0"/>
-              <a:t>4/5/2017</a:t>
+              <a:t>4/10/2017</a:t>
             </a:fld>
             <a:endParaRPr lang="en-US"/>
           </a:p>
@@ -2553,7 +2553,7 @@
           <a:p>
             <a:fld id="{47A08BB3-D61A-425D-94C0-51D2E3EE8512}" type="datetimeFigureOut">
               <a:rPr lang="en-US" smtClean="0"/>
-              <a:t>4/5/2017</a:t>
+              <a:t>4/10/2017</a:t>
             </a:fld>
             <a:endParaRPr lang="en-US"/>
           </a:p>
@@ -2810,7 +2810,7 @@
           <a:p>
             <a:fld id="{47A08BB3-D61A-425D-94C0-51D2E3EE8512}" type="datetimeFigureOut">
               <a:rPr lang="en-US" smtClean="0"/>
-              <a:t>4/5/2017</a:t>
+              <a:t>4/10/2017</a:t>
             </a:fld>
             <a:endParaRPr lang="en-US"/>
           </a:p>
@@ -3072,7 +3072,7 @@
           <a:p>
             <a:fld id="{47A08BB3-D61A-425D-94C0-51D2E3EE8512}" type="datetimeFigureOut">
               <a:rPr lang="en-US" smtClean="0"/>
-              <a:t>4/5/2017</a:t>
+              <a:t>4/10/2017</a:t>
             </a:fld>
             <a:endParaRPr lang="en-US"/>
           </a:p>
@@ -3334,7 +3334,7 @@
           <a:p>
             <a:fld id="{47A08BB3-D61A-425D-94C0-51D2E3EE8512}" type="datetimeFigureOut">
               <a:rPr lang="en-US" smtClean="0"/>
-              <a:t>4/5/2017</a:t>
+              <a:t>4/10/2017</a:t>
             </a:fld>
             <a:endParaRPr lang="en-US"/>
           </a:p>
@@ -3663,7 +3663,7 @@
           <a:p>
             <a:fld id="{47A08BB3-D61A-425D-94C0-51D2E3EE8512}" type="datetimeFigureOut">
               <a:rPr lang="en-US" smtClean="0"/>
-              <a:t>4/5/2017</a:t>
+              <a:t>4/10/2017</a:t>
             </a:fld>
             <a:endParaRPr lang="en-US"/>
           </a:p>
@@ -3986,7 +3986,7 @@
           <a:p>
             <a:fld id="{47A08BB3-D61A-425D-94C0-51D2E3EE8512}" type="datetimeFigureOut">
               <a:rPr lang="en-US" smtClean="0"/>
-              <a:t>4/5/2017</a:t>
+              <a:t>4/10/2017</a:t>
             </a:fld>
             <a:endParaRPr lang="en-US"/>
           </a:p>
@@ -4443,7 +4443,7 @@
           <a:p>
             <a:fld id="{47A08BB3-D61A-425D-94C0-51D2E3EE8512}" type="datetimeFigureOut">
               <a:rPr lang="en-US" smtClean="0"/>
-              <a:t>4/5/2017</a:t>
+              <a:t>4/10/2017</a:t>
             </a:fld>
             <a:endParaRPr lang="en-US"/>
           </a:p>
@@ -4648,7 +4648,7 @@
           <a:p>
             <a:fld id="{47A08BB3-D61A-425D-94C0-51D2E3EE8512}" type="datetimeFigureOut">
               <a:rPr lang="en-US" smtClean="0"/>
-              <a:t>4/5/2017</a:t>
+              <a:t>4/10/2017</a:t>
             </a:fld>
             <a:endParaRPr lang="en-US"/>
           </a:p>
@@ -4825,7 +4825,7 @@
           <a:p>
             <a:fld id="{47A08BB3-D61A-425D-94C0-51D2E3EE8512}" type="datetimeFigureOut">
               <a:rPr lang="en-US" smtClean="0"/>
-              <a:t>4/5/2017</a:t>
+              <a:t>4/10/2017</a:t>
             </a:fld>
             <a:endParaRPr lang="en-US"/>
           </a:p>
@@ -5165,7 +5165,7 @@
           <a:p>
             <a:fld id="{47A08BB3-D61A-425D-94C0-51D2E3EE8512}" type="datetimeFigureOut">
               <a:rPr lang="en-US" smtClean="0"/>
-              <a:t>4/5/2017</a:t>
+              <a:t>4/10/2017</a:t>
             </a:fld>
             <a:endParaRPr lang="en-US"/>
           </a:p>
@@ -5510,7 +5510,7 @@
           <a:p>
             <a:fld id="{47A08BB3-D61A-425D-94C0-51D2E3EE8512}" type="datetimeFigureOut">
               <a:rPr lang="en-US" smtClean="0"/>
-              <a:t>4/5/2017</a:t>
+              <a:t>4/10/2017</a:t>
             </a:fld>
             <a:endParaRPr lang="en-US"/>
           </a:p>
@@ -7627,7 +7627,7 @@
           <a:p>
             <a:fld id="{47A08BB3-D61A-425D-94C0-51D2E3EE8512}" type="datetimeFigureOut">
               <a:rPr lang="en-US" smtClean="0"/>
-              <a:t>4/5/2017</a:t>
+              <a:t>4/10/2017</a:t>
             </a:fld>
             <a:endParaRPr lang="en-US"/>
           </a:p>
@@ -8261,12 +8261,14 @@
         </p:nvSpPr>
         <p:spPr>
           <a:xfrm>
-            <a:off x="7435231" y="3451558"/>
-            <a:ext cx="3553766" cy="1999328"/>
+            <a:off x="7637171" y="4597758"/>
+            <a:ext cx="3351825" cy="853128"/>
           </a:xfrm>
         </p:spPr>
         <p:txBody>
-          <a:bodyPr/>
+          <a:bodyPr>
+            <a:normAutofit fontScale="92500" lnSpcReduction="10000"/>
+          </a:bodyPr>
           <a:lstStyle/>
           <a:p>
             <a:r>
@@ -8341,6 +8343,45 @@
           </a:p>
           <a:p>
             <a:endParaRPr lang="en-US" dirty="0"/>
+          </a:p>
+        </p:txBody>
+      </p:sp>
+      <p:sp>
+        <p:nvSpPr>
+          <p:cNvPr id="4" name="TextBox 3"/>
+          <p:cNvSpPr txBox="1"/>
+          <p:nvPr/>
+        </p:nvSpPr>
+        <p:spPr>
+          <a:xfrm>
+            <a:off x="1703329" y="1635617"/>
+            <a:ext cx="8432344" cy="830997"/>
+          </a:xfrm>
+          <a:prstGeom prst="rect">
+            <a:avLst/>
+          </a:prstGeom>
+          <a:noFill/>
+        </p:spPr>
+        <p:txBody>
+          <a:bodyPr wrap="square" rtlCol="0">
+            <a:spAutoFit/>
+          </a:bodyPr>
+          <a:lstStyle/>
+          <a:p>
+            <a:pPr algn="ctr"/>
+            <a:r>
+              <a:rPr lang="en-US" sz="4800" dirty="0" smtClean="0">
+                <a:solidFill>
+                  <a:schemeClr val="accent1"/>
+                </a:solidFill>
+              </a:rPr>
+              <a:t>Citizen Journalism</a:t>
+            </a:r>
+            <a:endParaRPr lang="en-US" sz="4800" dirty="0">
+              <a:solidFill>
+                <a:schemeClr val="accent1"/>
+              </a:solidFill>
+            </a:endParaRPr>
           </a:p>
         </p:txBody>
       </p:sp>
@@ -8695,7 +8736,19 @@
             </a:pPr>
             <a:r>
               <a:rPr lang="en-US" sz="2400" dirty="0"/>
-              <a:t>Provide a new news channel that should be unbiased</a:t>
+              <a:t>Provide a new </a:t>
+            </a:r>
+            <a:r>
+              <a:rPr lang="en-US" sz="2400" dirty="0">
+                <a:solidFill>
+                  <a:srgbClr val="C00000"/>
+                </a:solidFill>
+              </a:rPr>
+              <a:t>news channel </a:t>
+            </a:r>
+            <a:r>
+              <a:rPr lang="en-US" sz="2400" dirty="0"/>
+              <a:t>that should be unbiased</a:t>
             </a:r>
           </a:p>
           <a:p>
@@ -8715,7 +8768,15 @@
             </a:pPr>
             <a:r>
               <a:rPr lang="en-US" sz="2400" dirty="0"/>
-              <a:t>Get video of a news from all channels related to o news and provide that on website</a:t>
+              <a:t>Get video of a news from all channels related to o news and provide that on </a:t>
+            </a:r>
+            <a:r>
+              <a:rPr lang="en-US" sz="2400" dirty="0">
+                <a:solidFill>
+                  <a:srgbClr val="C00000"/>
+                </a:solidFill>
+              </a:rPr>
+              <a:t>website</a:t>
             </a:r>
           </a:p>
           <a:p>
@@ -9057,13 +9118,14 @@
             </a:endParaRPr>
           </a:p>
           <a:p>
-            <a:pPr marL="2286000" lvl="4" indent="-457200">
-              <a:buFont typeface="+mj-lt"/>
-              <a:buAutoNum type="arabicPeriod"/>
-            </a:pPr>
+            <a:pPr lvl="4"/>
+            <a:r>
+              <a:rPr lang="en-US" sz="2400" dirty="0" smtClean="0"/>
+              <a:t>5.   A </a:t>
+            </a:r>
             <a:r>
               <a:rPr lang="en-US" sz="2400" dirty="0"/>
-              <a:t>A website on which news of all newspaper is accumulated</a:t>
+              <a:t>website on which news of all newspaper is accumulated</a:t>
             </a:r>
             <a:r>
               <a:rPr lang="en-US" sz="2400" dirty="0" smtClean="0"/>
@@ -9078,13 +9140,14 @@
             <a:endParaRPr lang="en-US" sz="2400" dirty="0"/>
           </a:p>
           <a:p>
-            <a:pPr marL="2286000" lvl="4" indent="-457200">
-              <a:buFont typeface="+mj-lt"/>
-              <a:buAutoNum type="arabicPeriod"/>
-            </a:pPr>
+            <a:pPr lvl="4"/>
+            <a:r>
+              <a:rPr lang="en-US" sz="2400" dirty="0" smtClean="0"/>
+              <a:t>6. On </a:t>
+            </a:r>
             <a:r>
               <a:rPr lang="en-US" sz="2400" dirty="0"/>
-              <a:t>On that website he can select his interest and can get all news according to his need</a:t>
+              <a:t>that website he can select his interest and can get all news according to his need</a:t>
             </a:r>
             <a:r>
               <a:rPr lang="en-US" sz="2400" dirty="0" smtClean="0"/>
@@ -9099,13 +9162,14 @@
             <a:endParaRPr lang="en-US" sz="2400" dirty="0"/>
           </a:p>
           <a:p>
-            <a:pPr marL="2286000" lvl="4" indent="-457200">
-              <a:buFont typeface="+mj-lt"/>
-              <a:buAutoNum type="arabicPeriod"/>
-            </a:pPr>
+            <a:pPr lvl="4"/>
+            <a:r>
+              <a:rPr lang="en-US" sz="2400" dirty="0" smtClean="0"/>
+              <a:t>7. He </a:t>
+            </a:r>
             <a:r>
               <a:rPr lang="en-US" sz="2400" dirty="0"/>
-              <a:t>He should select a credible source of news and most accurate source of news so, that he could refrain from other news sources</a:t>
+              <a:t>should select a credible source of news and most accurate source of news so, that he could refrain from other news sources</a:t>
             </a:r>
             <a:r>
               <a:rPr lang="en-US" sz="2400" dirty="0" smtClean="0"/>
@@ -9120,13 +9184,14 @@
             <a:endParaRPr lang="en-US" sz="2400" dirty="0"/>
           </a:p>
           <a:p>
-            <a:pPr marL="2286000" lvl="4" indent="-457200">
-              <a:buFont typeface="+mj-lt"/>
-              <a:buAutoNum type="arabicPeriod"/>
-            </a:pPr>
+            <a:pPr lvl="4"/>
+            <a:r>
+              <a:rPr lang="en-US" sz="2400" dirty="0" smtClean="0"/>
+              <a:t>8. News </a:t>
+            </a:r>
             <a:r>
               <a:rPr lang="en-US" sz="2400" dirty="0"/>
-              <a:t>News accumulative on one </a:t>
+              <a:t>accumulative on one </a:t>
             </a:r>
             <a:r>
               <a:rPr lang="en-US" sz="2400" dirty="0" smtClean="0"/>
@@ -9141,13 +9206,14 @@
             <a:endParaRPr lang="en-US" sz="2400" dirty="0"/>
           </a:p>
           <a:p>
-            <a:pPr marL="2286000" lvl="4" indent="-457200">
-              <a:buFont typeface="+mj-lt"/>
-              <a:buAutoNum type="arabicPeriod"/>
-            </a:pPr>
+            <a:pPr lvl="4"/>
+            <a:r>
+              <a:rPr lang="en-US" sz="2400" dirty="0" smtClean="0"/>
+              <a:t>9. Video </a:t>
+            </a:r>
             <a:r>
               <a:rPr lang="en-US" sz="2400" dirty="0"/>
-              <a:t>Video sources on which all news are presented at one time.</a:t>
+              <a:t>sources on which all news are presented at one time.</a:t>
             </a:r>
           </a:p>
           <a:p>
@@ -10960,15 +11026,21 @@
             <p:ph type="title"/>
           </p:nvPr>
         </p:nvSpPr>
-        <p:spPr/>
+        <p:spPr>
+          <a:xfrm>
+            <a:off x="1493950" y="624110"/>
+            <a:ext cx="10010662" cy="675586"/>
+          </a:xfrm>
+        </p:spPr>
         <p:txBody>
           <a:bodyPr/>
           <a:lstStyle/>
           <a:p>
+            <a:pPr algn="ctr"/>
             <a:r>
               <a:rPr lang="en-US" dirty="0">
                 <a:solidFill>
-                  <a:srgbClr val="FF0000"/>
+                  <a:schemeClr val="accent1"/>
                 </a:solidFill>
               </a:rPr>
               <a:t>Additional Interviews</a:t>
@@ -11034,6 +11106,16 @@
               <a:t>		We interviewed </a:t>
             </a:r>
             <a:r>
+              <a:rPr lang="en-US" sz="2200" dirty="0">
+                <a:solidFill>
+                  <a:srgbClr val="FF0000"/>
+                </a:solidFill>
+                <a:latin typeface="Times New Roman" panose="02020603050405020304" pitchFamily="18" charset="0"/>
+                <a:cs typeface="Times New Roman" panose="02020603050405020304" pitchFamily="18" charset="0"/>
+              </a:rPr>
+              <a:t>t</a:t>
+            </a:r>
+            <a:r>
               <a:rPr lang="en-US" sz="2200" dirty="0" smtClean="0">
                 <a:solidFill>
                   <a:srgbClr val="FF0000"/>
@@ -11041,7 +11123,17 @@
                 <a:latin typeface="Times New Roman" panose="02020603050405020304" pitchFamily="18" charset="0"/>
                 <a:cs typeface="Times New Roman" panose="02020603050405020304" pitchFamily="18" charset="0"/>
               </a:rPr>
-              <a:t>Three more </a:t>
+              <a:t>hree </a:t>
+            </a:r>
+            <a:r>
+              <a:rPr lang="en-US" sz="2200" dirty="0" smtClean="0">
+                <a:solidFill>
+                  <a:srgbClr val="FF0000"/>
+                </a:solidFill>
+                <a:latin typeface="Times New Roman" panose="02020603050405020304" pitchFamily="18" charset="0"/>
+                <a:cs typeface="Times New Roman" panose="02020603050405020304" pitchFamily="18" charset="0"/>
+              </a:rPr>
+              <a:t>more </a:t>
             </a:r>
             <a:r>
               <a:rPr lang="en-US" sz="2200" dirty="0" smtClean="0">
@@ -11614,7 +11706,12 @@
             <p:ph type="title"/>
           </p:nvPr>
         </p:nvSpPr>
-        <p:spPr/>
+        <p:spPr>
+          <a:xfrm>
+            <a:off x="1558902" y="1036234"/>
+            <a:ext cx="8915401" cy="715293"/>
+          </a:xfrm>
+        </p:spPr>
         <p:txBody>
           <a:bodyPr/>
           <a:lstStyle/>
@@ -11658,7 +11755,19 @@
           <a:p>
             <a:r>
               <a:rPr lang="en-US" sz="2400" dirty="0" smtClean="0"/>
-              <a:t>Tested with three users </a:t>
+              <a:t>Tested with </a:t>
+            </a:r>
+            <a:r>
+              <a:rPr lang="en-US" sz="2400" dirty="0" smtClean="0">
+                <a:solidFill>
+                  <a:srgbClr val="C00000"/>
+                </a:solidFill>
+              </a:rPr>
+              <a:t>three</a:t>
+            </a:r>
+            <a:r>
+              <a:rPr lang="en-US" sz="2400" dirty="0" smtClean="0"/>
+              <a:t> users </a:t>
             </a:r>
           </a:p>
           <a:p>
@@ -11756,7 +11865,12 @@
             <p:ph type="title"/>
           </p:nvPr>
         </p:nvSpPr>
-        <p:spPr/>
+        <p:spPr>
+          <a:xfrm>
+            <a:off x="1639888" y="1023355"/>
+            <a:ext cx="8911687" cy="766808"/>
+          </a:xfrm>
+        </p:spPr>
         <p:txBody>
           <a:bodyPr/>
           <a:lstStyle/>
@@ -11819,9 +11933,18 @@
           </a:p>
           <a:p>
             <a:r>
+              <a:rPr lang="en-US" sz="2400" dirty="0" smtClean="0"/>
+              <a:t>They </a:t>
+            </a:r>
+            <a:r>
               <a:rPr lang="en-US" sz="2400" dirty="0"/>
-              <a:t>Part they like about prototype was personalized news</a:t>
-            </a:r>
+              <a:t>like </a:t>
+            </a:r>
+            <a:r>
+              <a:rPr lang="en-US" sz="2400" dirty="0" smtClean="0"/>
+              <a:t>personalized news’s part in prototype</a:t>
+            </a:r>
+            <a:endParaRPr lang="en-US" sz="2400" dirty="0"/>
           </a:p>
           <a:p>
             <a:r>
@@ -11894,7 +12017,12 @@
             <p:ph type="title"/>
           </p:nvPr>
         </p:nvSpPr>
-        <p:spPr/>
+        <p:spPr>
+          <a:xfrm>
+            <a:off x="1511099" y="1009403"/>
+            <a:ext cx="8911687" cy="715293"/>
+          </a:xfrm>
+        </p:spPr>
         <p:txBody>
           <a:bodyPr/>
           <a:lstStyle/>
@@ -11953,14 +12081,12 @@
           </a:p>
           <a:p>
             <a:r>
+              <a:rPr lang="en-US" sz="2400" smtClean="0"/>
+              <a:t>Want </a:t>
+            </a:r>
+            <a:r>
               <a:rPr lang="en-US" sz="2400" dirty="0" smtClean="0"/>
-              <a:t>Do not want tweets of different personalities </a:t>
-            </a:r>
-          </a:p>
-          <a:p>
-            <a:r>
-              <a:rPr lang="en-US" sz="2400" dirty="0" smtClean="0"/>
-              <a:t>Want concise form of news extracted from those tweet</a:t>
+              <a:t>concise form of news extracted from those tweet</a:t>
             </a:r>
           </a:p>
           <a:p>

</xml_diff>